<commit_message>
get list from db
</commit_message>
<xml_diff>
--- a/todo_plan.pptx
+++ b/todo_plan.pptx
@@ -104,6 +104,11 @@
       </a:defRPr>
     </a:lvl9pPr>
   </p:defaultTextStyle>
+  <p:extLst>
+    <p:ext uri="{EFAFB233-063F-42B5-8137-9DF3F51BA10A}">
+      <p15:sldGuideLst xmlns:p15="http://schemas.microsoft.com/office/powerpoint/2012/main"/>
+    </p:ext>
+  </p:extLst>
 </p:presentation>
 </file>
 
@@ -254,7 +259,7 @@
           <a:p>
             <a:fld id="{E7BEFA75-A156-4CFA-B260-F70E871C6FF0}" type="datetimeFigureOut">
               <a:rPr lang="ko-KR" altLang="en-US" smtClean="0"/>
-              <a:t>2019-03-30</a:t>
+              <a:t>2019-04-14</a:t>
             </a:fld>
             <a:endParaRPr lang="ko-KR" altLang="en-US"/>
           </a:p>
@@ -452,7 +457,7 @@
           <a:p>
             <a:fld id="{E7BEFA75-A156-4CFA-B260-F70E871C6FF0}" type="datetimeFigureOut">
               <a:rPr lang="ko-KR" altLang="en-US" smtClean="0"/>
-              <a:t>2019-03-30</a:t>
+              <a:t>2019-04-14</a:t>
             </a:fld>
             <a:endParaRPr lang="ko-KR" altLang="en-US"/>
           </a:p>
@@ -660,7 +665,7 @@
           <a:p>
             <a:fld id="{E7BEFA75-A156-4CFA-B260-F70E871C6FF0}" type="datetimeFigureOut">
               <a:rPr lang="ko-KR" altLang="en-US" smtClean="0"/>
-              <a:t>2019-03-30</a:t>
+              <a:t>2019-04-14</a:t>
             </a:fld>
             <a:endParaRPr lang="ko-KR" altLang="en-US"/>
           </a:p>
@@ -858,7 +863,7 @@
           <a:p>
             <a:fld id="{E7BEFA75-A156-4CFA-B260-F70E871C6FF0}" type="datetimeFigureOut">
               <a:rPr lang="ko-KR" altLang="en-US" smtClean="0"/>
-              <a:t>2019-03-30</a:t>
+              <a:t>2019-04-14</a:t>
             </a:fld>
             <a:endParaRPr lang="ko-KR" altLang="en-US"/>
           </a:p>
@@ -1133,7 +1138,7 @@
           <a:p>
             <a:fld id="{E7BEFA75-A156-4CFA-B260-F70E871C6FF0}" type="datetimeFigureOut">
               <a:rPr lang="ko-KR" altLang="en-US" smtClean="0"/>
-              <a:t>2019-03-30</a:t>
+              <a:t>2019-04-14</a:t>
             </a:fld>
             <a:endParaRPr lang="ko-KR" altLang="en-US"/>
           </a:p>
@@ -1398,7 +1403,7 @@
           <a:p>
             <a:fld id="{E7BEFA75-A156-4CFA-B260-F70E871C6FF0}" type="datetimeFigureOut">
               <a:rPr lang="ko-KR" altLang="en-US" smtClean="0"/>
-              <a:t>2019-03-30</a:t>
+              <a:t>2019-04-14</a:t>
             </a:fld>
             <a:endParaRPr lang="ko-KR" altLang="en-US"/>
           </a:p>
@@ -1810,7 +1815,7 @@
           <a:p>
             <a:fld id="{E7BEFA75-A156-4CFA-B260-F70E871C6FF0}" type="datetimeFigureOut">
               <a:rPr lang="ko-KR" altLang="en-US" smtClean="0"/>
-              <a:t>2019-03-30</a:t>
+              <a:t>2019-04-14</a:t>
             </a:fld>
             <a:endParaRPr lang="ko-KR" altLang="en-US"/>
           </a:p>
@@ -1951,7 +1956,7 @@
           <a:p>
             <a:fld id="{E7BEFA75-A156-4CFA-B260-F70E871C6FF0}" type="datetimeFigureOut">
               <a:rPr lang="ko-KR" altLang="en-US" smtClean="0"/>
-              <a:t>2019-03-30</a:t>
+              <a:t>2019-04-14</a:t>
             </a:fld>
             <a:endParaRPr lang="ko-KR" altLang="en-US"/>
           </a:p>
@@ -2064,7 +2069,7 @@
           <a:p>
             <a:fld id="{E7BEFA75-A156-4CFA-B260-F70E871C6FF0}" type="datetimeFigureOut">
               <a:rPr lang="ko-KR" altLang="en-US" smtClean="0"/>
-              <a:t>2019-03-30</a:t>
+              <a:t>2019-04-14</a:t>
             </a:fld>
             <a:endParaRPr lang="ko-KR" altLang="en-US"/>
           </a:p>
@@ -2375,7 +2380,7 @@
           <a:p>
             <a:fld id="{E7BEFA75-A156-4CFA-B260-F70E871C6FF0}" type="datetimeFigureOut">
               <a:rPr lang="ko-KR" altLang="en-US" smtClean="0"/>
-              <a:t>2019-03-30</a:t>
+              <a:t>2019-04-14</a:t>
             </a:fld>
             <a:endParaRPr lang="ko-KR" altLang="en-US"/>
           </a:p>
@@ -2663,7 +2668,7 @@
           <a:p>
             <a:fld id="{E7BEFA75-A156-4CFA-B260-F70E871C6FF0}" type="datetimeFigureOut">
               <a:rPr lang="ko-KR" altLang="en-US" smtClean="0"/>
-              <a:t>2019-03-30</a:t>
+              <a:t>2019-04-14</a:t>
             </a:fld>
             <a:endParaRPr lang="ko-KR" altLang="en-US"/>
           </a:p>
@@ -2904,7 +2909,7 @@
           <a:p>
             <a:fld id="{E7BEFA75-A156-4CFA-B260-F70E871C6FF0}" type="datetimeFigureOut">
               <a:rPr lang="ko-KR" altLang="en-US" smtClean="0"/>
-              <a:t>2019-03-30</a:t>
+              <a:t>2019-04-14</a:t>
             </a:fld>
             <a:endParaRPr lang="ko-KR" altLang="en-US"/>
           </a:p>
@@ -3335,7 +3340,7 @@
         </p:nvSpPr>
         <p:spPr>
           <a:xfrm>
-            <a:off x="5486493" y="1133950"/>
+            <a:off x="5332990" y="1127760"/>
             <a:ext cx="2966720" cy="461665"/>
           </a:xfrm>
           <a:prstGeom prst="rect">
@@ -3826,105 +3831,6 @@
           </p:sp>
           <p:sp>
             <p:nvSpPr>
-              <p:cNvPr id="28" name="더하기 기호 27">
-                <a:extLst>
-                  <a:ext uri="{FF2B5EF4-FFF2-40B4-BE49-F238E27FC236}">
-                    <a16:creationId xmlns:a16="http://schemas.microsoft.com/office/drawing/2014/main" id="{E47FA146-0F0D-478A-95BD-E8C5B979F4D3}"/>
-                  </a:ext>
-                </a:extLst>
-              </p:cNvPr>
-              <p:cNvSpPr/>
-              <p:nvPr/>
-            </p:nvSpPr>
-            <p:spPr>
-              <a:xfrm>
-                <a:off x="817880" y="5186680"/>
-                <a:ext cx="436880" cy="386080"/>
-              </a:xfrm>
-              <a:prstGeom prst="mathPlus">
-                <a:avLst/>
-              </a:prstGeom>
-              <a:solidFill>
-                <a:schemeClr val="bg1"/>
-              </a:solidFill>
-            </p:spPr>
-            <p:style>
-              <a:lnRef idx="2">
-                <a:schemeClr val="accent1">
-                  <a:shade val="50000"/>
-                </a:schemeClr>
-              </a:lnRef>
-              <a:fillRef idx="1">
-                <a:schemeClr val="accent1"/>
-              </a:fillRef>
-              <a:effectRef idx="0">
-                <a:schemeClr val="accent1"/>
-              </a:effectRef>
-              <a:fontRef idx="minor">
-                <a:schemeClr val="lt1"/>
-              </a:fontRef>
-            </p:style>
-            <p:txBody>
-              <a:bodyPr rtlCol="0" anchor="ctr"/>
-              <a:lstStyle/>
-              <a:p>
-                <a:pPr algn="ctr"/>
-                <a:endParaRPr lang="ko-KR" altLang="en-US"/>
-              </a:p>
-            </p:txBody>
-          </p:sp>
-          <p:sp>
-            <p:nvSpPr>
-              <p:cNvPr id="29" name="원형: 비어 있음 28">
-                <a:extLst>
-                  <a:ext uri="{FF2B5EF4-FFF2-40B4-BE49-F238E27FC236}">
-                    <a16:creationId xmlns:a16="http://schemas.microsoft.com/office/drawing/2014/main" id="{DCEA371F-F8B5-4932-92AD-792480F9781E}"/>
-                  </a:ext>
-                </a:extLst>
-              </p:cNvPr>
-              <p:cNvSpPr/>
-              <p:nvPr/>
-            </p:nvSpPr>
-            <p:spPr>
-              <a:xfrm>
-                <a:off x="3667760" y="2184401"/>
-                <a:ext cx="248893" cy="213359"/>
-              </a:xfrm>
-              <a:prstGeom prst="donut">
-                <a:avLst/>
-              </a:prstGeom>
-            </p:spPr>
-            <p:style>
-              <a:lnRef idx="2">
-                <a:schemeClr val="accent1">
-                  <a:shade val="50000"/>
-                </a:schemeClr>
-              </a:lnRef>
-              <a:fillRef idx="1">
-                <a:schemeClr val="accent1"/>
-              </a:fillRef>
-              <a:effectRef idx="0">
-                <a:schemeClr val="accent1"/>
-              </a:effectRef>
-              <a:fontRef idx="minor">
-                <a:schemeClr val="lt1"/>
-              </a:fontRef>
-            </p:style>
-            <p:txBody>
-              <a:bodyPr rtlCol="0" anchor="ctr"/>
-              <a:lstStyle/>
-              <a:p>
-                <a:pPr algn="ctr"/>
-                <a:endParaRPr lang="ko-KR" altLang="en-US">
-                  <a:solidFill>
-                    <a:schemeClr val="tx1"/>
-                  </a:solidFill>
-                </a:endParaRPr>
-              </a:p>
-            </p:txBody>
-          </p:sp>
-          <p:sp>
-            <p:nvSpPr>
               <p:cNvPr id="30" name="별: 꼭짓점 5개 29">
                 <a:extLst>
                   <a:ext uri="{FF2B5EF4-FFF2-40B4-BE49-F238E27FC236}">
@@ -4361,7 +4267,7 @@
           </p:nvSpPr>
           <p:spPr>
             <a:xfrm>
-              <a:off x="3242208" y="2554305"/>
+              <a:off x="1026991" y="2637164"/>
               <a:ext cx="538480" cy="400110"/>
             </a:xfrm>
             <a:prstGeom prst="rect">
@@ -4407,7 +4313,7 @@
           </p:nvSpPr>
           <p:spPr>
             <a:xfrm>
-              <a:off x="3553469" y="2555828"/>
+              <a:off x="3771524" y="2464223"/>
               <a:ext cx="538480" cy="400110"/>
             </a:xfrm>
             <a:prstGeom prst="rect">
@@ -4429,52 +4335,6 @@
                   <a:latin typeface="Arial Black" panose="020B0A04020102020204" pitchFamily="34" charset="0"/>
                 </a:rPr>
                 <a:t>6</a:t>
-              </a:r>
-              <a:endParaRPr lang="ko-KR" altLang="en-US" sz="2000" dirty="0">
-                <a:solidFill>
-                  <a:srgbClr val="FF0000"/>
-                </a:solidFill>
-                <a:latin typeface="Arial Black" panose="020B0A04020102020204" pitchFamily="34" charset="0"/>
-              </a:endParaRPr>
-            </a:p>
-          </p:txBody>
-        </p:sp>
-        <p:sp>
-          <p:nvSpPr>
-            <p:cNvPr id="44" name="TextBox 43">
-              <a:extLst>
-                <a:ext uri="{FF2B5EF4-FFF2-40B4-BE49-F238E27FC236}">
-                  <a16:creationId xmlns:a16="http://schemas.microsoft.com/office/drawing/2014/main" id="{B29A968C-649A-4C0F-8946-2ACE77919DDF}"/>
-                </a:ext>
-              </a:extLst>
-            </p:cNvPr>
-            <p:cNvSpPr txBox="1"/>
-            <p:nvPr/>
-          </p:nvSpPr>
-          <p:spPr>
-            <a:xfrm>
-              <a:off x="506520" y="5204098"/>
-              <a:ext cx="538480" cy="400110"/>
-            </a:xfrm>
-            <a:prstGeom prst="rect">
-              <a:avLst/>
-            </a:prstGeom>
-            <a:noFill/>
-          </p:spPr>
-          <p:txBody>
-            <a:bodyPr wrap="square" rtlCol="0">
-              <a:spAutoFit/>
-            </a:bodyPr>
-            <a:lstStyle/>
-            <a:p>
-              <a:r>
-                <a:rPr lang="en-US" altLang="ko-KR" sz="2000" dirty="0">
-                  <a:solidFill>
-                    <a:srgbClr val="FF0000"/>
-                  </a:solidFill>
-                  <a:latin typeface="Arial Black" panose="020B0A04020102020204" pitchFamily="34" charset="0"/>
-                </a:rPr>
-                <a:t>7</a:t>
               </a:r>
               <a:endParaRPr lang="ko-KR" altLang="en-US" sz="2000" dirty="0">
                 <a:solidFill>
@@ -4592,7 +4452,7 @@
         </p:nvSpPr>
         <p:spPr>
           <a:xfrm>
-            <a:off x="5512906" y="1981870"/>
+            <a:off x="5332990" y="1732554"/>
             <a:ext cx="6449226" cy="3693319"/>
           </a:xfrm>
           <a:prstGeom prst="rect">
@@ -4615,7 +4475,7 @@
                 <a:ea typeface="함초롬돋움" panose="020B0604000101010101" pitchFamily="50" charset="-127"/>
                 <a:cs typeface="함초롬돋움" panose="020B0604000101010101" pitchFamily="50" charset="-127"/>
               </a:rPr>
-              <a:t>날짜</a:t>
+              <a:t>오늘 날짜</a:t>
             </a:r>
             <a:r>
               <a:rPr lang="en-US" altLang="ko-KR" dirty="0">
@@ -4623,7 +4483,7 @@
                 <a:ea typeface="함초롬돋움" panose="020B0604000101010101" pitchFamily="50" charset="-127"/>
                 <a:cs typeface="함초롬돋움" panose="020B0604000101010101" pitchFamily="50" charset="-127"/>
               </a:rPr>
-              <a:t> (</a:t>
+              <a:t> (ex. </a:t>
             </a:r>
             <a:r>
               <a:rPr lang="ko-KR" altLang="en-US" dirty="0">
@@ -4686,13 +4546,31 @@
               </a:rPr>
               <a:t>할 일 작성하기 </a:t>
             </a:r>
+            <a:endParaRPr lang="en-US" altLang="ko-KR" dirty="0">
+              <a:latin typeface="함초롬돋움" panose="020B0604000101010101" pitchFamily="50" charset="-127"/>
+              <a:ea typeface="함초롬돋움" panose="020B0604000101010101" pitchFamily="50" charset="-127"/>
+              <a:cs typeface="함초롬돋움" panose="020B0604000101010101" pitchFamily="50" charset="-127"/>
+            </a:endParaRPr>
+          </a:p>
+          <a:p>
+            <a:pPr marL="342900" indent="-342900">
+              <a:buAutoNum type="arabicParenR"/>
+            </a:pPr>
+            <a:r>
+              <a:rPr lang="ko-KR" altLang="en-US" dirty="0">
+                <a:latin typeface="함초롬돋움" panose="020B0604000101010101" pitchFamily="50" charset="-127"/>
+                <a:ea typeface="함초롬돋움" panose="020B0604000101010101" pitchFamily="50" charset="-127"/>
+                <a:cs typeface="함초롬돋움" panose="020B0604000101010101" pitchFamily="50" charset="-127"/>
+              </a:rPr>
+              <a:t>정렬 버튼 </a:t>
+            </a:r>
             <a:r>
               <a:rPr lang="en-US" altLang="ko-KR" dirty="0">
                 <a:latin typeface="함초롬돋움" panose="020B0604000101010101" pitchFamily="50" charset="-127"/>
                 <a:ea typeface="함초롬돋움" panose="020B0604000101010101" pitchFamily="50" charset="-127"/>
                 <a:cs typeface="함초롬돋움" panose="020B0604000101010101" pitchFamily="50" charset="-127"/>
               </a:rPr>
-              <a:t>(7</a:t>
+              <a:t>(1.</a:t>
             </a:r>
             <a:r>
               <a:rPr lang="ko-KR" altLang="en-US" dirty="0">
@@ -4700,7 +4578,7 @@
                 <a:ea typeface="함초롬돋움" panose="020B0604000101010101" pitchFamily="50" charset="-127"/>
                 <a:cs typeface="함초롬돋움" panose="020B0604000101010101" pitchFamily="50" charset="-127"/>
               </a:rPr>
-              <a:t>번 버튼을 통해서도 작성 가능</a:t>
+              <a:t>날짜 내림차순 </a:t>
             </a:r>
             <a:r>
               <a:rPr lang="en-US" altLang="ko-KR" dirty="0">
@@ -4708,20 +4586,15 @@
                 <a:ea typeface="함초롬돋움" panose="020B0604000101010101" pitchFamily="50" charset="-127"/>
                 <a:cs typeface="함초롬돋움" panose="020B0604000101010101" pitchFamily="50" charset="-127"/>
               </a:rPr>
-              <a:t>)</a:t>
-            </a:r>
-          </a:p>
-          <a:p>
-            <a:pPr marL="342900" indent="-342900">
-              <a:buAutoNum type="arabicParenR"/>
-            </a:pPr>
+              <a:t>2. </a:t>
+            </a:r>
             <a:r>
               <a:rPr lang="ko-KR" altLang="en-US" dirty="0">
                 <a:latin typeface="함초롬돋움" panose="020B0604000101010101" pitchFamily="50" charset="-127"/>
                 <a:ea typeface="함초롬돋움" panose="020B0604000101010101" pitchFamily="50" charset="-127"/>
                 <a:cs typeface="함초롬돋움" panose="020B0604000101010101" pitchFamily="50" charset="-127"/>
               </a:rPr>
-              <a:t>정렬 버튼 </a:t>
+              <a:t>우선 순위</a:t>
             </a:r>
             <a:r>
               <a:rPr lang="en-US" altLang="ko-KR" dirty="0">
@@ -4729,7 +4602,17 @@
                 <a:ea typeface="함초롬돋움" panose="020B0604000101010101" pitchFamily="50" charset="-127"/>
                 <a:cs typeface="함초롬돋움" panose="020B0604000101010101" pitchFamily="50" charset="-127"/>
               </a:rPr>
-              <a:t>(1.</a:t>
+              <a:t>)</a:t>
+            </a:r>
+          </a:p>
+          <a:p>
+            <a:r>
+              <a:rPr lang="en-US" altLang="ko-KR" dirty="0">
+                <a:latin typeface="함초롬돋움" panose="020B0604000101010101" pitchFamily="50" charset="-127"/>
+                <a:ea typeface="함초롬돋움" panose="020B0604000101010101" pitchFamily="50" charset="-127"/>
+                <a:cs typeface="함초롬돋움" panose="020B0604000101010101" pitchFamily="50" charset="-127"/>
+              </a:rPr>
+              <a:t> + </a:t>
             </a:r>
             <a:r>
               <a:rPr lang="ko-KR" altLang="en-US" dirty="0">
@@ -4737,7 +4620,7 @@
                 <a:ea typeface="함초롬돋움" panose="020B0604000101010101" pitchFamily="50" charset="-127"/>
                 <a:cs typeface="함초롬돋움" panose="020B0604000101010101" pitchFamily="50" charset="-127"/>
               </a:rPr>
-              <a:t>날짜 최신 순 </a:t>
+              <a:t>언제 작성했는 지 날짜는 표시 </a:t>
             </a:r>
             <a:r>
               <a:rPr lang="en-US" altLang="ko-KR" dirty="0">
@@ -4745,23 +4628,7 @@
                 <a:ea typeface="함초롬돋움" panose="020B0604000101010101" pitchFamily="50" charset="-127"/>
                 <a:cs typeface="함초롬돋움" panose="020B0604000101010101" pitchFamily="50" charset="-127"/>
               </a:rPr>
-              <a:t>2. </a:t>
-            </a:r>
-            <a:r>
-              <a:rPr lang="ko-KR" altLang="en-US" dirty="0">
-                <a:latin typeface="함초롬돋움" panose="020B0604000101010101" pitchFamily="50" charset="-127"/>
-                <a:ea typeface="함초롬돋움" panose="020B0604000101010101" pitchFamily="50" charset="-127"/>
-                <a:cs typeface="함초롬돋움" panose="020B0604000101010101" pitchFamily="50" charset="-127"/>
-              </a:rPr>
-              <a:t>우선 순위</a:t>
-            </a:r>
-            <a:r>
-              <a:rPr lang="en-US" altLang="ko-KR" dirty="0">
-                <a:latin typeface="함초롬돋움" panose="020B0604000101010101" pitchFamily="50" charset="-127"/>
-                <a:ea typeface="함초롬돋움" panose="020B0604000101010101" pitchFamily="50" charset="-127"/>
-                <a:cs typeface="함초롬돋움" panose="020B0604000101010101" pitchFamily="50" charset="-127"/>
-              </a:rPr>
-              <a:t>)</a:t>
+              <a:t>X</a:t>
             </a:r>
           </a:p>
           <a:p>
@@ -4782,9 +4649,14 @@
             </a:endParaRPr>
           </a:p>
           <a:p>
-            <a:pPr marL="342900" indent="-342900">
-              <a:buAutoNum type="arabicParenR"/>
-            </a:pPr>
+            <a:r>
+              <a:rPr lang="en-US" altLang="ko-KR" dirty="0">
+                <a:latin typeface="함초롬돋움" panose="020B0604000101010101" pitchFamily="50" charset="-127"/>
+                <a:ea typeface="함초롬돋움" panose="020B0604000101010101" pitchFamily="50" charset="-127"/>
+                <a:cs typeface="함초롬돋움" panose="020B0604000101010101" pitchFamily="50" charset="-127"/>
+              </a:rPr>
+              <a:t>4) </a:t>
+            </a:r>
             <a:r>
               <a:rPr lang="ko-KR" altLang="en-US" dirty="0">
                 <a:latin typeface="함초롬돋움" panose="020B0604000101010101" pitchFamily="50" charset="-127"/>
@@ -4867,16 +4739,21 @@
             </a:r>
           </a:p>
           <a:p>
-            <a:pPr marL="342900" indent="-342900">
-              <a:buAutoNum type="arabicParenR"/>
-            </a:pPr>
+            <a:r>
+              <a:rPr lang="en-US" altLang="ko-KR" dirty="0">
+                <a:latin typeface="함초롬돋움" panose="020B0604000101010101" pitchFamily="50" charset="-127"/>
+                <a:ea typeface="함초롬돋움" panose="020B0604000101010101" pitchFamily="50" charset="-127"/>
+                <a:cs typeface="함초롬돋움" panose="020B0604000101010101" pitchFamily="50" charset="-127"/>
+              </a:rPr>
+              <a:t>5) </a:t>
+            </a:r>
             <a:r>
               <a:rPr lang="ko-KR" altLang="en-US" dirty="0">
                 <a:latin typeface="함초롬돋움" panose="020B0604000101010101" pitchFamily="50" charset="-127"/>
                 <a:ea typeface="함초롬돋움" panose="020B0604000101010101" pitchFamily="50" charset="-127"/>
                 <a:cs typeface="함초롬돋움" panose="020B0604000101010101" pitchFamily="50" charset="-127"/>
               </a:rPr>
-              <a:t>할 일 완료버튼</a:t>
+              <a:t>할 일 표시</a:t>
             </a:r>
             <a:r>
               <a:rPr lang="en-US" altLang="ko-KR" dirty="0">
@@ -4892,7 +4769,7 @@
                 <a:ea typeface="함초롬돋움" panose="020B0604000101010101" pitchFamily="50" charset="-127"/>
                 <a:cs typeface="함초롬돋움" panose="020B0604000101010101" pitchFamily="50" charset="-127"/>
               </a:rPr>
-              <a:t>작성된 내용에 줄이 그어짐</a:t>
+              <a:t>두 번 누르면 내용 수정</a:t>
             </a:r>
             <a:endParaRPr lang="en-US" altLang="ko-KR" dirty="0">
               <a:latin typeface="함초롬돋움" panose="020B0604000101010101" pitchFamily="50" charset="-127"/>
@@ -4901,9 +4778,14 @@
             </a:endParaRPr>
           </a:p>
           <a:p>
-            <a:pPr marL="342900" indent="-342900">
-              <a:buAutoNum type="arabicParenR"/>
-            </a:pPr>
+            <a:r>
+              <a:rPr lang="en-US" altLang="ko-KR" dirty="0">
+                <a:latin typeface="함초롬돋움" panose="020B0604000101010101" pitchFamily="50" charset="-127"/>
+                <a:ea typeface="함초롬돋움" panose="020B0604000101010101" pitchFamily="50" charset="-127"/>
+                <a:cs typeface="함초롬돋움" panose="020B0604000101010101" pitchFamily="50" charset="-127"/>
+              </a:rPr>
+              <a:t>6) X </a:t>
+            </a:r>
             <a:r>
               <a:rPr lang="ko-KR" altLang="en-US" dirty="0">
                 <a:latin typeface="함초롬돋움" panose="020B0604000101010101" pitchFamily="50" charset="-127"/>
@@ -4950,13 +4832,16 @@
                 <a:ea typeface="함초롬돋움" panose="020B0604000101010101" pitchFamily="50" charset="-127"/>
                 <a:cs typeface="함초롬돋움" panose="020B0604000101010101" pitchFamily="50" charset="-127"/>
               </a:rPr>
-              <a:t>)</a:t>
-            </a:r>
-          </a:p>
-          <a:p>
-            <a:pPr marL="342900" indent="-342900">
-              <a:buAutoNum type="arabicParenR"/>
-            </a:pPr>
+              <a:t>) / O </a:t>
+            </a:r>
+            <a:r>
+              <a:rPr lang="ko-KR" altLang="en-US" dirty="0">
+                <a:latin typeface="함초롬돋움" panose="020B0604000101010101" pitchFamily="50" charset="-127"/>
+                <a:ea typeface="함초롬돋움" panose="020B0604000101010101" pitchFamily="50" charset="-127"/>
+                <a:cs typeface="함초롬돋움" panose="020B0604000101010101" pitchFamily="50" charset="-127"/>
+              </a:rPr>
+              <a:t>완료 버튼</a:t>
+            </a:r>
             <a:endParaRPr lang="en-US" altLang="ko-KR" dirty="0">
               <a:latin typeface="함초롬돋움" panose="020B0604000101010101" pitchFamily="50" charset="-127"/>
               <a:ea typeface="함초롬돋움" panose="020B0604000101010101" pitchFamily="50" charset="-127"/>
@@ -4964,9 +4849,6 @@
             </a:endParaRPr>
           </a:p>
           <a:p>
-            <a:pPr marL="342900" indent="-342900">
-              <a:buAutoNum type="arabicParenR"/>
-            </a:pPr>
             <a:endParaRPr lang="en-US" altLang="ko-KR" dirty="0">
               <a:latin typeface="함초롬돋움" panose="020B0604000101010101" pitchFamily="50" charset="-127"/>
               <a:ea typeface="함초롬돋움" panose="020B0604000101010101" pitchFamily="50" charset="-127"/>
@@ -4981,16 +4863,21 @@
             </a:endParaRPr>
           </a:p>
           <a:p>
-            <a:pPr marL="342900" indent="-342900">
-              <a:buAutoNum type="arabicParenR"/>
-            </a:pPr>
+            <a:r>
+              <a:rPr lang="en-US" altLang="ko-KR" dirty="0">
+                <a:latin typeface="함초롬돋움" panose="020B0604000101010101" pitchFamily="50" charset="-127"/>
+                <a:ea typeface="함초롬돋움" panose="020B0604000101010101" pitchFamily="50" charset="-127"/>
+                <a:cs typeface="함초롬돋움" panose="020B0604000101010101" pitchFamily="50" charset="-127"/>
+              </a:rPr>
+              <a:t>7) </a:t>
+            </a:r>
             <a:r>
               <a:rPr lang="ko-KR" altLang="en-US" dirty="0">
                 <a:latin typeface="함초롬돋움" panose="020B0604000101010101" pitchFamily="50" charset="-127"/>
                 <a:ea typeface="함초롬돋움" panose="020B0604000101010101" pitchFamily="50" charset="-127"/>
                 <a:cs typeface="함초롬돋움" panose="020B0604000101010101" pitchFamily="50" charset="-127"/>
               </a:rPr>
-              <a:t>내용 추가 </a:t>
+              <a:t>완료한 리스트 내용 보여주기</a:t>
             </a:r>
             <a:r>
               <a:rPr lang="en-US" altLang="ko-KR" dirty="0">
@@ -4998,7 +4885,7 @@
                 <a:ea typeface="함초롬돋움" panose="020B0604000101010101" pitchFamily="50" charset="-127"/>
                 <a:cs typeface="함초롬돋움" panose="020B0604000101010101" pitchFamily="50" charset="-127"/>
               </a:rPr>
-              <a:t>-&gt; 2</a:t>
+              <a:t>, </a:t>
             </a:r>
             <a:r>
               <a:rPr lang="ko-KR" altLang="en-US" dirty="0">
@@ -5006,7 +4893,7 @@
                 <a:ea typeface="함초롬돋움" panose="020B0604000101010101" pitchFamily="50" charset="-127"/>
                 <a:cs typeface="함초롬돋움" panose="020B0604000101010101" pitchFamily="50" charset="-127"/>
               </a:rPr>
-              <a:t>번 박스에 입력</a:t>
+              <a:t>다시 누르면 원래 리스트</a:t>
             </a:r>
             <a:endParaRPr lang="en-US" altLang="ko-KR" dirty="0">
               <a:latin typeface="함초롬돋움" panose="020B0604000101010101" pitchFamily="50" charset="-127"/>
@@ -5015,9 +4902,14 @@
             </a:endParaRPr>
           </a:p>
           <a:p>
-            <a:pPr marL="342900" indent="-342900">
-              <a:buAutoNum type="arabicParenR"/>
-            </a:pPr>
+            <a:r>
+              <a:rPr lang="en-US" altLang="ko-KR" dirty="0">
+                <a:latin typeface="함초롬돋움" panose="020B0604000101010101" pitchFamily="50" charset="-127"/>
+                <a:ea typeface="함초롬돋움" panose="020B0604000101010101" pitchFamily="50" charset="-127"/>
+                <a:cs typeface="함초롬돋움" panose="020B0604000101010101" pitchFamily="50" charset="-127"/>
+              </a:rPr>
+              <a:t>8) </a:t>
+            </a:r>
             <a:r>
               <a:rPr lang="ko-KR" altLang="en-US" dirty="0">
                 <a:latin typeface="함초롬돋움" panose="020B0604000101010101" pitchFamily="50" charset="-127"/>
@@ -5089,7 +4981,7 @@
         <p:spPr>
           <a:xfrm>
             <a:off x="1246664" y="2454191"/>
-            <a:ext cx="2266126" cy="359656"/>
+            <a:ext cx="2386208" cy="359656"/>
           </a:xfrm>
           <a:prstGeom prst="frame">
             <a:avLst/>
@@ -5126,6 +5018,156 @@
               <a:solidFill>
                 <a:schemeClr val="tx1"/>
               </a:solidFill>
+            </a:endParaRPr>
+          </a:p>
+        </p:txBody>
+      </p:sp>
+      <p:sp>
+        <p:nvSpPr>
+          <p:cNvPr id="2" name="TextBox 1">
+            <a:extLst>
+              <a:ext uri="{FF2B5EF4-FFF2-40B4-BE49-F238E27FC236}">
+                <a16:creationId xmlns:a16="http://schemas.microsoft.com/office/drawing/2014/main" id="{A42E31DC-976D-4D17-8CDA-78FBB1BB8C9F}"/>
+              </a:ext>
+            </a:extLst>
+          </p:cNvPr>
+          <p:cNvSpPr txBox="1"/>
+          <p:nvPr/>
+        </p:nvSpPr>
+        <p:spPr>
+          <a:xfrm>
+            <a:off x="899775" y="5240843"/>
+            <a:ext cx="2007734" cy="523220"/>
+          </a:xfrm>
+          <a:prstGeom prst="rect">
+            <a:avLst/>
+          </a:prstGeom>
+          <a:noFill/>
+        </p:spPr>
+        <p:txBody>
+          <a:bodyPr wrap="square" rtlCol="0">
+            <a:spAutoFit/>
+          </a:bodyPr>
+          <a:lstStyle/>
+          <a:p>
+            <a:r>
+              <a:rPr lang="en-US" altLang="ko-KR" sz="1400" dirty="0">
+                <a:solidFill>
+                  <a:schemeClr val="bg1"/>
+                </a:solidFill>
+              </a:rPr>
+              <a:t>Com</a:t>
+            </a:r>
+          </a:p>
+          <a:p>
+            <a:r>
+              <a:rPr lang="en-US" altLang="ko-KR" sz="1400" dirty="0" err="1">
+                <a:solidFill>
+                  <a:schemeClr val="bg1"/>
+                </a:solidFill>
+              </a:rPr>
+              <a:t>plete</a:t>
+            </a:r>
+            <a:endParaRPr lang="ko-KR" altLang="en-US" sz="1400" dirty="0">
+              <a:solidFill>
+                <a:schemeClr val="bg1"/>
+              </a:solidFill>
+            </a:endParaRPr>
+          </a:p>
+        </p:txBody>
+      </p:sp>
+      <p:sp>
+        <p:nvSpPr>
+          <p:cNvPr id="3" name="원형: 비어 있음 2">
+            <a:extLst>
+              <a:ext uri="{FF2B5EF4-FFF2-40B4-BE49-F238E27FC236}">
+                <a16:creationId xmlns:a16="http://schemas.microsoft.com/office/drawing/2014/main" id="{65786935-D703-47B4-ACF0-C2034A8B28D2}"/>
+              </a:ext>
+            </a:extLst>
+          </p:cNvPr>
+          <p:cNvSpPr/>
+          <p:nvPr/>
+        </p:nvSpPr>
+        <p:spPr>
+          <a:xfrm>
+            <a:off x="3679284" y="2619446"/>
+            <a:ext cx="220068" cy="184007"/>
+          </a:xfrm>
+          <a:prstGeom prst="donut">
+            <a:avLst/>
+          </a:prstGeom>
+        </p:spPr>
+        <p:style>
+          <a:lnRef idx="2">
+            <a:schemeClr val="accent1">
+              <a:shade val="50000"/>
+            </a:schemeClr>
+          </a:lnRef>
+          <a:fillRef idx="1">
+            <a:schemeClr val="accent1"/>
+          </a:fillRef>
+          <a:effectRef idx="0">
+            <a:schemeClr val="accent1"/>
+          </a:effectRef>
+          <a:fontRef idx="minor">
+            <a:schemeClr val="lt1"/>
+          </a:fontRef>
+        </p:style>
+        <p:txBody>
+          <a:bodyPr rtlCol="0" anchor="ctr"/>
+          <a:lstStyle/>
+          <a:p>
+            <a:pPr algn="ctr"/>
+            <a:endParaRPr lang="ko-KR" altLang="en-US">
+              <a:solidFill>
+                <a:schemeClr val="tx1"/>
+              </a:solidFill>
+            </a:endParaRPr>
+          </a:p>
+        </p:txBody>
+      </p:sp>
+      <p:sp>
+        <p:nvSpPr>
+          <p:cNvPr id="44" name="TextBox 43">
+            <a:extLst>
+              <a:ext uri="{FF2B5EF4-FFF2-40B4-BE49-F238E27FC236}">
+                <a16:creationId xmlns:a16="http://schemas.microsoft.com/office/drawing/2014/main" id="{2608DE25-4B92-459E-B409-A939D8ADE2D9}"/>
+              </a:ext>
+            </a:extLst>
+          </p:cNvPr>
+          <p:cNvSpPr txBox="1"/>
+          <p:nvPr/>
+        </p:nvSpPr>
+        <p:spPr>
+          <a:xfrm>
+            <a:off x="1258285" y="4853054"/>
+            <a:ext cx="538480" cy="400110"/>
+          </a:xfrm>
+          <a:prstGeom prst="rect">
+            <a:avLst/>
+          </a:prstGeom>
+          <a:noFill/>
+        </p:spPr>
+        <p:txBody>
+          <a:bodyPr wrap="square" rtlCol="0">
+            <a:spAutoFit/>
+          </a:bodyPr>
+          <a:lstStyle/>
+          <a:p>
+            <a:r>
+              <a:rPr lang="en-US" altLang="ko-KR" sz="2000" dirty="0">
+                <a:solidFill>
+                  <a:srgbClr val="FF0000"/>
+                </a:solidFill>
+                <a:latin typeface="Arial Black" panose="020B0A04020102020204" pitchFamily="34" charset="0"/>
+              </a:rPr>
+              <a:t>7</a:t>
+            </a:r>
+            <a:endParaRPr lang="ko-KR" altLang="en-US" sz="2000" dirty="0">
+              <a:solidFill>
+                <a:srgbClr val="FF0000"/>
+              </a:solidFill>
+              <a:latin typeface="Arial Black" panose="020B0A04020102020204" pitchFamily="34" charset="0"/>
             </a:endParaRPr>
           </a:p>
         </p:txBody>

</xml_diff>